<commit_message>
master.erl - fixed when multiple servers are down, distribution is down only once and not as the number of the servers.
</commit_message>
<xml_diff>
--- a/doc/final.pptx
+++ b/doc/final.pptx
@@ -8525,8 +8525,8 @@
         </p:nvSpPr>
         <p:spPr>
           <a:xfrm>
-            <a:off x="220387" y="1405376"/>
-            <a:ext cx="7759832" cy="4832092"/>
+            <a:off x="220386" y="1405376"/>
+            <a:ext cx="7963673" cy="5693866"/>
           </a:xfrm>
           <a:prstGeom prst="rect">
             <a:avLst/>
@@ -8810,27 +8810,8 @@
                   </a:schemeClr>
                 </a:solidFill>
               </a:rPr>
-              <a:t>Run the </a:t>
-            </a:r>
-            <a:r>
-              <a:rPr lang="en-US" sz="1400" b="1">
-                <a:solidFill>
-                  <a:schemeClr val="tx2">
-                    <a:lumMod val="95000"/>
-                    <a:lumOff val="5000"/>
-                  </a:schemeClr>
-                </a:solidFill>
-              </a:rPr>
-              <a:t>system </a:t>
-            </a:r>
-            <a:endParaRPr lang="en-US" sz="1400" b="1" dirty="0">
-              <a:solidFill>
-                <a:schemeClr val="tx2">
-                  <a:lumMod val="95000"/>
-                  <a:lumOff val="5000"/>
-                </a:schemeClr>
-              </a:solidFill>
-            </a:endParaRPr>
+              <a:t>Run the system </a:t>
+            </a:r>
           </a:p>
           <a:p>
             <a:pPr lvl="2" algn="l" rtl="0"/>
@@ -8948,24 +8929,16 @@
                   </a:schemeClr>
                 </a:solidFill>
               </a:rPr>
-              <a:t>&gt; erl –name client# -run wxclient start</a:t>
-            </a:r>
-            <a:endParaRPr lang="en-US" sz="1400" u="sng" dirty="0">
-              <a:solidFill>
-                <a:schemeClr val="tx2">
-                  <a:lumMod val="95000"/>
-                  <a:lumOff val="5000"/>
-                </a:schemeClr>
-              </a:solidFill>
-            </a:endParaRPr>
+              <a:t>&gt; erl –name client# -run wxclient start	</a:t>
+            </a:r>
           </a:p>
           <a:p>
             <a:pPr lvl="2" algn="l" rtl="0"/>
             <a:endParaRPr lang="en-US" sz="1400" u="sng" dirty="0">
               <a:solidFill>
                 <a:schemeClr val="tx2">
-                  <a:lumMod val="95000"/>
-                  <a:lumOff val="5000"/>
+                  <a:lumMod val="50000"/>
+                  <a:lumOff val="50000"/>
                 </a:schemeClr>
               </a:solidFill>
             </a:endParaRPr>
@@ -9005,6 +8978,86 @@
               </a:rPr>
               <a:t>&gt; erl –name master –run master start_link</a:t>
             </a:r>
+          </a:p>
+          <a:p>
+            <a:pPr lvl="2" algn="l" rtl="0"/>
+            <a:endParaRPr lang="en-US" sz="1400" u="sng" dirty="0">
+              <a:solidFill>
+                <a:schemeClr val="tx2">
+                  <a:lumMod val="50000"/>
+                  <a:lumOff val="50000"/>
+                </a:schemeClr>
+              </a:solidFill>
+            </a:endParaRPr>
+          </a:p>
+          <a:p>
+            <a:pPr lvl="2" algn="l" rtl="0"/>
+            <a:r>
+              <a:rPr lang="en-US" sz="1400" dirty="0">
+                <a:solidFill>
+                  <a:schemeClr val="tx2">
+                    <a:lumMod val="50000"/>
+                    <a:lumOff val="50000"/>
+                  </a:schemeClr>
+                </a:solidFill>
+              </a:rPr>
+              <a:t>*for client you may need to open shell “erl –</a:t>
+            </a:r>
+            <a:r>
+              <a:rPr lang="en-US" sz="1400" dirty="0" err="1">
+                <a:solidFill>
+                  <a:schemeClr val="tx2">
+                    <a:lumMod val="50000"/>
+                    <a:lumOff val="50000"/>
+                  </a:schemeClr>
+                </a:solidFill>
+              </a:rPr>
+              <a:t>sname</a:t>
+            </a:r>
+            <a:r>
+              <a:rPr lang="en-US" sz="1400" dirty="0">
+                <a:solidFill>
+                  <a:schemeClr val="tx2">
+                    <a:lumMod val="50000"/>
+                    <a:lumOff val="50000"/>
+                  </a:schemeClr>
+                </a:solidFill>
+              </a:rPr>
+              <a:t> client”, and write “</a:t>
+            </a:r>
+            <a:r>
+              <a:rPr lang="en-US" sz="1400" dirty="0" err="1">
+                <a:solidFill>
+                  <a:schemeClr val="tx2">
+                    <a:lumMod val="50000"/>
+                    <a:lumOff val="50000"/>
+                  </a:schemeClr>
+                </a:solidFill>
+              </a:rPr>
+              <a:t>wxclient:start</a:t>
+            </a:r>
+            <a:r>
+              <a:rPr lang="en-US" sz="1400">
+                <a:solidFill>
+                  <a:schemeClr val="tx2">
+                    <a:lumMod val="50000"/>
+                    <a:lumOff val="50000"/>
+                  </a:schemeClr>
+                </a:solidFill>
+              </a:rPr>
+              <a:t>()”</a:t>
+            </a:r>
+            <a:endParaRPr lang="en-US" sz="1400" u="sng" dirty="0">
+              <a:solidFill>
+                <a:schemeClr val="tx2">
+                  <a:lumMod val="95000"/>
+                  <a:lumOff val="5000"/>
+                </a:schemeClr>
+              </a:solidFill>
+            </a:endParaRPr>
+          </a:p>
+          <a:p>
+            <a:pPr lvl="2" algn="l" rtl="0"/>
             <a:endParaRPr lang="en-US" sz="1400" u="sng" dirty="0">
               <a:solidFill>
                 <a:schemeClr val="tx2">

</xml_diff>

<commit_message>
Think we are done.
</commit_message>
<xml_diff>
--- a/doc/final.pptx
+++ b/doc/final.pptx
@@ -9037,7 +9037,7 @@
               <a:t>wxclient:start</a:t>
             </a:r>
             <a:r>
-              <a:rPr lang="en-US" sz="1400">
+              <a:rPr lang="en-US" sz="1400" dirty="0">
                 <a:solidFill>
                   <a:schemeClr val="tx2">
                     <a:lumMod val="50000"/>
@@ -11387,7 +11387,182 @@
                   <a:srgbClr val="000000"/>
                 </a:solidFill>
               </a:rPr>
-              <a:t>Handling Exceptions</a:t>
+              <a:t>Results</a:t>
+            </a:r>
+          </a:p>
+        </p:txBody>
+      </p:sp>
+      <p:pic>
+        <p:nvPicPr>
+          <p:cNvPr id="11" name="תמונה 10">
+            <a:extLst>
+              <a:ext uri="{FF2B5EF4-FFF2-40B4-BE49-F238E27FC236}">
+                <a16:creationId xmlns:a16="http://schemas.microsoft.com/office/drawing/2014/main" id="{C935D950-A542-4D3B-841C-24987D4A4FBC}"/>
+              </a:ext>
+            </a:extLst>
+          </p:cNvPr>
+          <p:cNvPicPr>
+            <a:picLocks noChangeAspect="1"/>
+          </p:cNvPicPr>
+          <p:nvPr/>
+        </p:nvPicPr>
+        <p:blipFill>
+          <a:blip r:embed="rId2">
+            <a:extLst>
+              <a:ext uri="{28A0092B-C50C-407E-A947-70E740481C1C}">
+                <a14:useLocalDpi xmlns:a14="http://schemas.microsoft.com/office/drawing/2010/main" val="0"/>
+              </a:ext>
+            </a:extLst>
+          </a:blip>
+          <a:stretch>
+            <a:fillRect/>
+          </a:stretch>
+        </p:blipFill>
+        <p:spPr>
+          <a:xfrm>
+            <a:off x="6495305" y="1375410"/>
+            <a:ext cx="5296327" cy="3242772"/>
+          </a:xfrm>
+          <a:prstGeom prst="rect">
+            <a:avLst/>
+          </a:prstGeom>
+        </p:spPr>
+      </p:pic>
+      <p:pic>
+        <p:nvPicPr>
+          <p:cNvPr id="13" name="תמונה 12">
+            <a:extLst>
+              <a:ext uri="{FF2B5EF4-FFF2-40B4-BE49-F238E27FC236}">
+                <a16:creationId xmlns:a16="http://schemas.microsoft.com/office/drawing/2014/main" id="{0A57163C-4BBA-4C94-96DB-B79689653C37}"/>
+              </a:ext>
+            </a:extLst>
+          </p:cNvPr>
+          <p:cNvPicPr>
+            <a:picLocks noChangeAspect="1"/>
+          </p:cNvPicPr>
+          <p:nvPr/>
+        </p:nvPicPr>
+        <p:blipFill>
+          <a:blip r:embed="rId3">
+            <a:extLst>
+              <a:ext uri="{28A0092B-C50C-407E-A947-70E740481C1C}">
+                <a14:useLocalDpi xmlns:a14="http://schemas.microsoft.com/office/drawing/2010/main" val="0"/>
+              </a:ext>
+            </a:extLst>
+          </a:blip>
+          <a:srcRect/>
+          <a:stretch/>
+        </p:blipFill>
+        <p:spPr bwMode="auto">
+          <a:xfrm>
+            <a:off x="840753" y="1375410"/>
+            <a:ext cx="5319603" cy="3242772"/>
+          </a:xfrm>
+          <a:prstGeom prst="rect">
+            <a:avLst/>
+          </a:prstGeom>
+          <a:ln>
+            <a:noFill/>
+          </a:ln>
+          <a:extLst>
+            <a:ext uri="{53640926-AAD7-44D8-BBD7-CCE9431645EC}">
+              <a14:shadowObscured xmlns:a14="http://schemas.microsoft.com/office/drawing/2010/main"/>
+            </a:ext>
+          </a:extLst>
+        </p:spPr>
+      </p:pic>
+      <p:sp>
+        <p:nvSpPr>
+          <p:cNvPr id="3" name="תיבת טקסט 2">
+            <a:extLst>
+              <a:ext uri="{FF2B5EF4-FFF2-40B4-BE49-F238E27FC236}">
+                <a16:creationId xmlns:a16="http://schemas.microsoft.com/office/drawing/2014/main" id="{9CF0596E-E189-441B-B297-D52819AE1521}"/>
+              </a:ext>
+            </a:extLst>
+          </p:cNvPr>
+          <p:cNvSpPr txBox="1"/>
+          <p:nvPr/>
+        </p:nvSpPr>
+        <p:spPr>
+          <a:xfrm>
+            <a:off x="1089892" y="4784436"/>
+            <a:ext cx="10012218" cy="1477328"/>
+          </a:xfrm>
+          <a:prstGeom prst="rect">
+            <a:avLst/>
+          </a:prstGeom>
+          <a:noFill/>
+        </p:spPr>
+        <p:txBody>
+          <a:bodyPr wrap="square" rtlCol="0">
+            <a:spAutoFit/>
+          </a:bodyPr>
+          <a:lstStyle/>
+          <a:p>
+            <a:pPr algn="l" rtl="0"/>
+            <a:r>
+              <a:rPr lang="en-US" dirty="0">
+                <a:solidFill>
+                  <a:schemeClr val="tx2">
+                    <a:lumMod val="95000"/>
+                    <a:lumOff val="5000"/>
+                  </a:schemeClr>
+                </a:solidFill>
+              </a:rPr>
+              <a:t>1 server has evaluation time of 7.5 seconds		5 servers has evaluation time of 3.7 seconds</a:t>
+            </a:r>
+          </a:p>
+          <a:p>
+            <a:pPr algn="l" rtl="0"/>
+            <a:endParaRPr lang="en-US" dirty="0">
+              <a:solidFill>
+                <a:schemeClr val="tx2">
+                  <a:lumMod val="95000"/>
+                  <a:lumOff val="5000"/>
+                </a:schemeClr>
+              </a:solidFill>
+            </a:endParaRPr>
+          </a:p>
+          <a:p>
+            <a:pPr algn="l" rtl="0"/>
+            <a:endParaRPr lang="en-US" dirty="0">
+              <a:solidFill>
+                <a:schemeClr val="tx2">
+                  <a:lumMod val="95000"/>
+                  <a:lumOff val="5000"/>
+                </a:schemeClr>
+              </a:solidFill>
+            </a:endParaRPr>
+          </a:p>
+          <a:p>
+            <a:pPr marL="1657350" lvl="3" indent="-285750" algn="l" rtl="0">
+              <a:buFont typeface="Wingdings" panose="05000000000000000000" pitchFamily="2" charset="2"/>
+              <a:buChar char="v"/>
+            </a:pPr>
+            <a:r>
+              <a:rPr lang="en-US" dirty="0">
+                <a:solidFill>
+                  <a:schemeClr val="tx2">
+                    <a:lumMod val="95000"/>
+                    <a:lumOff val="5000"/>
+                  </a:schemeClr>
+                </a:solidFill>
+              </a:rPr>
+              <a:t>	We can conclude that distributed programming has a direct connection to </a:t>
+            </a:r>
+          </a:p>
+          <a:p>
+            <a:pPr algn="l" rtl="0"/>
+            <a:r>
+              <a:rPr lang="en-US" dirty="0">
+                <a:solidFill>
+                  <a:schemeClr val="tx2">
+                    <a:lumMod val="95000"/>
+                    <a:lumOff val="5000"/>
+                  </a:schemeClr>
+                </a:solidFill>
+              </a:rPr>
+              <a:t>		The efficiency and runtime of the program.</a:t>
             </a:r>
           </a:p>
         </p:txBody>

</xml_diff>